<commit_message>
Finish the intro part of the weicc docs #2
</commit_message>
<xml_diff>
--- a/docs/figures/figures.pptx
+++ b/docs/figures/figures.pptx
@@ -201,7 +201,7 @@
           <a:p>
             <a:fld id="{B545521C-F840-6148-BCF9-B167DFC75B00}" type="datetimeFigureOut">
               <a:rPr lang="en-US" smtClean="0"/>
-              <a:t>4/17/22</a:t>
+              <a:t>5/14/22</a:t>
             </a:fld>
             <a:endParaRPr lang="en-US"/>
           </a:p>
@@ -1038,7 +1038,7 @@
           <a:p>
             <a:fld id="{656A6AFC-C896-E044-A6C6-3210656CBC62}" type="datetimeFigureOut">
               <a:rPr lang="en-US" smtClean="0"/>
-              <a:t>4/17/22</a:t>
+              <a:t>5/14/22</a:t>
             </a:fld>
             <a:endParaRPr lang="en-US"/>
           </a:p>
@@ -1238,7 +1238,7 @@
           <a:p>
             <a:fld id="{656A6AFC-C896-E044-A6C6-3210656CBC62}" type="datetimeFigureOut">
               <a:rPr lang="en-US" smtClean="0"/>
-              <a:t>4/17/22</a:t>
+              <a:t>5/14/22</a:t>
             </a:fld>
             <a:endParaRPr lang="en-US"/>
           </a:p>
@@ -1448,7 +1448,7 @@
           <a:p>
             <a:fld id="{656A6AFC-C896-E044-A6C6-3210656CBC62}" type="datetimeFigureOut">
               <a:rPr lang="en-US" smtClean="0"/>
-              <a:t>4/17/22</a:t>
+              <a:t>5/14/22</a:t>
             </a:fld>
             <a:endParaRPr lang="en-US"/>
           </a:p>
@@ -1683,7 +1683,7 @@
           <a:p>
             <a:fld id="{656A6AFC-C896-E044-A6C6-3210656CBC62}" type="datetimeFigureOut">
               <a:rPr lang="en-US" smtClean="0"/>
-              <a:t>4/17/22</a:t>
+              <a:t>5/14/22</a:t>
             </a:fld>
             <a:endParaRPr lang="en-US"/>
           </a:p>
@@ -1959,7 +1959,7 @@
           <a:p>
             <a:fld id="{656A6AFC-C896-E044-A6C6-3210656CBC62}" type="datetimeFigureOut">
               <a:rPr lang="en-US" smtClean="0"/>
-              <a:t>4/17/22</a:t>
+              <a:t>5/14/22</a:t>
             </a:fld>
             <a:endParaRPr lang="en-US"/>
           </a:p>
@@ -2227,7 +2227,7 @@
           <a:p>
             <a:fld id="{656A6AFC-C896-E044-A6C6-3210656CBC62}" type="datetimeFigureOut">
               <a:rPr lang="en-US" smtClean="0"/>
-              <a:t>4/17/22</a:t>
+              <a:t>5/14/22</a:t>
             </a:fld>
             <a:endParaRPr lang="en-US"/>
           </a:p>
@@ -2642,7 +2642,7 @@
           <a:p>
             <a:fld id="{656A6AFC-C896-E044-A6C6-3210656CBC62}" type="datetimeFigureOut">
               <a:rPr lang="en-US" smtClean="0"/>
-              <a:t>4/17/22</a:t>
+              <a:t>5/14/22</a:t>
             </a:fld>
             <a:endParaRPr lang="en-US"/>
           </a:p>
@@ -2784,7 +2784,7 @@
           <a:p>
             <a:fld id="{656A6AFC-C896-E044-A6C6-3210656CBC62}" type="datetimeFigureOut">
               <a:rPr lang="en-US" smtClean="0"/>
-              <a:t>4/17/22</a:t>
+              <a:t>5/14/22</a:t>
             </a:fld>
             <a:endParaRPr lang="en-US"/>
           </a:p>
@@ -2897,7 +2897,7 @@
           <a:p>
             <a:fld id="{656A6AFC-C896-E044-A6C6-3210656CBC62}" type="datetimeFigureOut">
               <a:rPr lang="en-US" smtClean="0"/>
-              <a:t>4/17/22</a:t>
+              <a:t>5/14/22</a:t>
             </a:fld>
             <a:endParaRPr lang="en-US"/>
           </a:p>
@@ -3210,7 +3210,7 @@
           <a:p>
             <a:fld id="{656A6AFC-C896-E044-A6C6-3210656CBC62}" type="datetimeFigureOut">
               <a:rPr lang="en-US" smtClean="0"/>
-              <a:t>4/17/22</a:t>
+              <a:t>5/14/22</a:t>
             </a:fld>
             <a:endParaRPr lang="en-US"/>
           </a:p>
@@ -3499,7 +3499,7 @@
           <a:p>
             <a:fld id="{656A6AFC-C896-E044-A6C6-3210656CBC62}" type="datetimeFigureOut">
               <a:rPr lang="en-US" smtClean="0"/>
-              <a:t>4/17/22</a:t>
+              <a:t>5/14/22</a:t>
             </a:fld>
             <a:endParaRPr lang="en-US"/>
           </a:p>
@@ -3742,7 +3742,7 @@
           <a:p>
             <a:fld id="{656A6AFC-C896-E044-A6C6-3210656CBC62}" type="datetimeFigureOut">
               <a:rPr lang="en-US" smtClean="0"/>
-              <a:t>4/17/22</a:t>
+              <a:t>5/14/22</a:t>
             </a:fld>
             <a:endParaRPr lang="en-US"/>
           </a:p>
@@ -5554,7 +5554,7 @@
             <a:pPr algn="ctr"/>
             <a:r>
               <a:rPr lang="en-US" dirty="0"/>
-              <a:t>Font End</a:t>
+              <a:t>Front End</a:t>
             </a:r>
           </a:p>
         </p:txBody>

</xml_diff>